<commit_message>
Write the functions tutorial
</commit_message>
<xml_diff>
--- a/LEarningFSharp.pptx
+++ b/LEarningFSharp.pptx
@@ -14,6 +14,8 @@
     <p:sldId id="262" r:id="rId8"/>
     <p:sldId id="263" r:id="rId9"/>
     <p:sldId id="264" r:id="rId10"/>
+    <p:sldId id="265" r:id="rId11"/>
+    <p:sldId id="266" r:id="rId12"/>
   </p:sldIdLst>
   <p:sldSz cx="12192000" cy="6858000"/>
   <p:notesSz cx="6858000" cy="9144000"/>
@@ -112,6 +114,11 @@
       </a:defRPr>
     </a:lvl9pPr>
   </p:defaultTextStyle>
+  <p:extLst>
+    <p:ext uri="{EFAFB233-063F-42B5-8137-9DF3F51BA10A}">
+      <p15:sldGuideLst xmlns:p15="http://schemas.microsoft.com/office/powerpoint/2012/main"/>
+    </p:ext>
+  </p:extLst>
 </p:presentation>
 </file>
 
@@ -446,7 +453,7 @@
           <a:p>
             <a:fld id="{7FA6A9ED-E431-4DBC-9471-94F234ED043C}" type="datetimeFigureOut">
               <a:rPr lang="fr-CA" smtClean="0"/>
-              <a:t>2018-02-19</a:t>
+              <a:t>2018-02-26</a:t>
             </a:fld>
             <a:endParaRPr lang="fr-CA"/>
           </a:p>
@@ -770,7 +777,7 @@
           <a:p>
             <a:fld id="{7FA6A9ED-E431-4DBC-9471-94F234ED043C}" type="datetimeFigureOut">
               <a:rPr lang="fr-CA" smtClean="0"/>
-              <a:t>2018-02-19</a:t>
+              <a:t>2018-02-26</a:t>
             </a:fld>
             <a:endParaRPr lang="fr-CA"/>
           </a:p>
@@ -1018,7 +1025,7 @@
           <a:p>
             <a:fld id="{7FA6A9ED-E431-4DBC-9471-94F234ED043C}" type="datetimeFigureOut">
               <a:rPr lang="fr-CA" smtClean="0"/>
-              <a:t>2018-02-19</a:t>
+              <a:t>2018-02-26</a:t>
             </a:fld>
             <a:endParaRPr lang="fr-CA"/>
           </a:p>
@@ -1357,7 +1364,7 @@
           <a:p>
             <a:fld id="{7FA6A9ED-E431-4DBC-9471-94F234ED043C}" type="datetimeFigureOut">
               <a:rPr lang="fr-CA" smtClean="0"/>
-              <a:t>2018-02-19</a:t>
+              <a:t>2018-02-26</a:t>
             </a:fld>
             <a:endParaRPr lang="fr-CA"/>
           </a:p>
@@ -1704,7 +1711,7 @@
           <a:p>
             <a:fld id="{7FA6A9ED-E431-4DBC-9471-94F234ED043C}" type="datetimeFigureOut">
               <a:rPr lang="fr-CA" smtClean="0"/>
-              <a:t>2018-02-19</a:t>
+              <a:t>2018-02-26</a:t>
             </a:fld>
             <a:endParaRPr lang="fr-CA"/>
           </a:p>
@@ -2078,7 +2085,7 @@
           <a:p>
             <a:fld id="{7FA6A9ED-E431-4DBC-9471-94F234ED043C}" type="datetimeFigureOut">
               <a:rPr lang="fr-CA" smtClean="0"/>
-              <a:t>2018-02-19</a:t>
+              <a:t>2018-02-26</a:t>
             </a:fld>
             <a:endParaRPr lang="fr-CA"/>
           </a:p>
@@ -2548,7 +2555,7 @@
           <a:p>
             <a:fld id="{7FA6A9ED-E431-4DBC-9471-94F234ED043C}" type="datetimeFigureOut">
               <a:rPr lang="fr-CA" smtClean="0"/>
-              <a:t>2018-02-19</a:t>
+              <a:t>2018-02-26</a:t>
             </a:fld>
             <a:endParaRPr lang="fr-CA"/>
           </a:p>
@@ -2753,7 +2760,7 @@
           <a:p>
             <a:fld id="{7FA6A9ED-E431-4DBC-9471-94F234ED043C}" type="datetimeFigureOut">
               <a:rPr lang="fr-CA" smtClean="0"/>
-              <a:t>2018-02-19</a:t>
+              <a:t>2018-02-26</a:t>
             </a:fld>
             <a:endParaRPr lang="fr-CA"/>
           </a:p>
@@ -2964,7 +2971,7 @@
           <a:p>
             <a:fld id="{7FA6A9ED-E431-4DBC-9471-94F234ED043C}" type="datetimeFigureOut">
               <a:rPr lang="fr-CA" smtClean="0"/>
-              <a:t>2018-02-19</a:t>
+              <a:t>2018-02-26</a:t>
             </a:fld>
             <a:endParaRPr lang="fr-CA"/>
           </a:p>
@@ -3196,7 +3203,7 @@
           <a:p>
             <a:fld id="{7FA6A9ED-E431-4DBC-9471-94F234ED043C}" type="datetimeFigureOut">
               <a:rPr lang="fr-CA" smtClean="0"/>
-              <a:t>2018-02-19</a:t>
+              <a:t>2018-02-26</a:t>
             </a:fld>
             <a:endParaRPr lang="fr-CA"/>
           </a:p>
@@ -3444,7 +3451,7 @@
           <a:p>
             <a:fld id="{7FA6A9ED-E431-4DBC-9471-94F234ED043C}" type="datetimeFigureOut">
               <a:rPr lang="fr-CA" smtClean="0"/>
-              <a:t>2018-02-19</a:t>
+              <a:t>2018-02-26</a:t>
             </a:fld>
             <a:endParaRPr lang="fr-CA"/>
           </a:p>
@@ -3742,7 +3749,7 @@
           <a:p>
             <a:fld id="{7FA6A9ED-E431-4DBC-9471-94F234ED043C}" type="datetimeFigureOut">
               <a:rPr lang="fr-CA" smtClean="0"/>
-              <a:t>2018-02-19</a:t>
+              <a:t>2018-02-26</a:t>
             </a:fld>
             <a:endParaRPr lang="fr-CA"/>
           </a:p>
@@ -4136,7 +4143,7 @@
           <a:p>
             <a:fld id="{7FA6A9ED-E431-4DBC-9471-94F234ED043C}" type="datetimeFigureOut">
               <a:rPr lang="fr-CA" smtClean="0"/>
-              <a:t>2018-02-19</a:t>
+              <a:t>2018-02-26</a:t>
             </a:fld>
             <a:endParaRPr lang="fr-CA"/>
           </a:p>
@@ -4285,7 +4292,7 @@
           <a:p>
             <a:fld id="{7FA6A9ED-E431-4DBC-9471-94F234ED043C}" type="datetimeFigureOut">
               <a:rPr lang="fr-CA" smtClean="0"/>
-              <a:t>2018-02-19</a:t>
+              <a:t>2018-02-26</a:t>
             </a:fld>
             <a:endParaRPr lang="fr-CA"/>
           </a:p>
@@ -4411,7 +4418,7 @@
           <a:p>
             <a:fld id="{7FA6A9ED-E431-4DBC-9471-94F234ED043C}" type="datetimeFigureOut">
               <a:rPr lang="fr-CA" smtClean="0"/>
-              <a:t>2018-02-19</a:t>
+              <a:t>2018-02-26</a:t>
             </a:fld>
             <a:endParaRPr lang="fr-CA"/>
           </a:p>
@@ -4666,7 +4673,7 @@
           <a:p>
             <a:fld id="{7FA6A9ED-E431-4DBC-9471-94F234ED043C}" type="datetimeFigureOut">
               <a:rPr lang="fr-CA" smtClean="0"/>
-              <a:t>2018-02-19</a:t>
+              <a:t>2018-02-26</a:t>
             </a:fld>
             <a:endParaRPr lang="fr-CA"/>
           </a:p>
@@ -4981,7 +4988,7 @@
           <a:p>
             <a:fld id="{7FA6A9ED-E431-4DBC-9471-94F234ED043C}" type="datetimeFigureOut">
               <a:rPr lang="fr-CA" smtClean="0"/>
-              <a:t>2018-02-19</a:t>
+              <a:t>2018-02-26</a:t>
             </a:fld>
             <a:endParaRPr lang="fr-CA"/>
           </a:p>
@@ -5332,7 +5339,7 @@
           <a:p>
             <a:fld id="{7FA6A9ED-E431-4DBC-9471-94F234ED043C}" type="datetimeFigureOut">
               <a:rPr lang="fr-CA" smtClean="0"/>
-              <a:t>2018-02-19</a:t>
+              <a:t>2018-02-26</a:t>
             </a:fld>
             <a:endParaRPr lang="fr-CA"/>
           </a:p>
@@ -5949,6 +5956,176 @@
 </p:sld>
 </file>
 
+<file path=ppt/slides/slide10.xml><?xml version="1.0" encoding="utf-8"?>
+<p:sld xmlns:a="http://schemas.openxmlformats.org/drawingml/2006/main" xmlns:r="http://schemas.openxmlformats.org/officeDocument/2006/relationships" xmlns:p="http://schemas.openxmlformats.org/presentationml/2006/main">
+  <p:cSld>
+    <p:spTree>
+      <p:nvGrpSpPr>
+        <p:cNvPr id="1" name=""/>
+        <p:cNvGrpSpPr/>
+        <p:nvPr/>
+      </p:nvGrpSpPr>
+      <p:grpSpPr>
+        <a:xfrm>
+          <a:off x="0" y="0"/>
+          <a:ext cx="0" cy="0"/>
+          <a:chOff x="0" y="0"/>
+          <a:chExt cx="0" cy="0"/>
+        </a:xfrm>
+      </p:grpSpPr>
+      <p:sp>
+        <p:nvSpPr>
+          <p:cNvPr id="2" name="Titre 1"/>
+          <p:cNvSpPr>
+            <a:spLocks noGrp="1"/>
+          </p:cNvSpPr>
+          <p:nvPr>
+            <p:ph type="title"/>
+          </p:nvPr>
+        </p:nvSpPr>
+        <p:spPr/>
+        <p:txBody>
+          <a:bodyPr>
+            <a:normAutofit fontScale="90000"/>
+          </a:bodyPr>
+          <a:lstStyle/>
+          <a:p>
+            <a:r>
+              <a:rPr lang="en-US" b="1" dirty="0"/>
+              <a:t>Mathematical functions</a:t>
+            </a:r>
+            <a:br>
+              <a:rPr lang="en-US" b="1" dirty="0"/>
+            </a:br>
+            <a:r>
+              <a:rPr lang="en-US" dirty="0"/>
+              <a:t/>
+            </a:r>
+            <a:br>
+              <a:rPr lang="en-US" dirty="0"/>
+            </a:br>
+            <a:endParaRPr lang="fr-CA" dirty="0"/>
+          </a:p>
+        </p:txBody>
+      </p:sp>
+      <p:sp>
+        <p:nvSpPr>
+          <p:cNvPr id="3" name="Espace réservé du texte 2"/>
+          <p:cNvSpPr>
+            <a:spLocks noGrp="1"/>
+          </p:cNvSpPr>
+          <p:nvPr>
+            <p:ph type="body" idx="1"/>
+          </p:nvPr>
+        </p:nvSpPr>
+        <p:spPr/>
+        <p:txBody>
+          <a:bodyPr/>
+          <a:lstStyle/>
+          <a:p>
+            <a:r>
+              <a:rPr lang="en-US" dirty="0"/>
+              <a:t>The impetus behind functional programming</a:t>
+            </a:r>
+            <a:endParaRPr lang="fr-CA" dirty="0"/>
+          </a:p>
+        </p:txBody>
+      </p:sp>
+    </p:spTree>
+    <p:extLst>
+      <p:ext uri="{BB962C8B-B14F-4D97-AF65-F5344CB8AC3E}">
+        <p14:creationId xmlns:p14="http://schemas.microsoft.com/office/powerpoint/2010/main" val="2969214340"/>
+      </p:ext>
+    </p:extLst>
+  </p:cSld>
+  <p:clrMapOvr>
+    <a:masterClrMapping/>
+  </p:clrMapOvr>
+</p:sld>
+</file>
+
+<file path=ppt/slides/slide11.xml><?xml version="1.0" encoding="utf-8"?>
+<p:sld xmlns:a="http://schemas.openxmlformats.org/drawingml/2006/main" xmlns:r="http://schemas.openxmlformats.org/officeDocument/2006/relationships" xmlns:p="http://schemas.openxmlformats.org/presentationml/2006/main">
+  <p:cSld>
+    <p:spTree>
+      <p:nvGrpSpPr>
+        <p:cNvPr id="1" name=""/>
+        <p:cNvGrpSpPr/>
+        <p:nvPr/>
+      </p:nvGrpSpPr>
+      <p:grpSpPr>
+        <a:xfrm>
+          <a:off x="0" y="0"/>
+          <a:ext cx="0" cy="0"/>
+          <a:chOff x="0" y="0"/>
+          <a:chExt cx="0" cy="0"/>
+        </a:xfrm>
+      </p:grpSpPr>
+      <p:sp>
+        <p:nvSpPr>
+          <p:cNvPr id="2" name="Titre 1"/>
+          <p:cNvSpPr>
+            <a:spLocks noGrp="1"/>
+          </p:cNvSpPr>
+          <p:nvPr>
+            <p:ph type="title"/>
+          </p:nvPr>
+        </p:nvSpPr>
+        <p:spPr/>
+        <p:txBody>
+          <a:bodyPr/>
+          <a:lstStyle/>
+          <a:p>
+            <a:r>
+              <a:rPr lang="en-US" dirty="0" smtClean="0"/>
+              <a:t>Add1(x) = x + 1</a:t>
+            </a:r>
+            <a:endParaRPr lang="fr-CA" dirty="0"/>
+          </a:p>
+        </p:txBody>
+      </p:sp>
+      <p:pic>
+        <p:nvPicPr>
+          <p:cNvPr id="5" name="Espace réservé du contenu 4"/>
+          <p:cNvPicPr>
+            <a:picLocks noGrp="1" noChangeAspect="1"/>
+          </p:cNvPicPr>
+          <p:nvPr>
+            <p:ph idx="1"/>
+          </p:nvPr>
+        </p:nvPicPr>
+        <p:blipFill>
+          <a:blip r:embed="rId2">
+            <a:extLst>
+              <a:ext uri="{28A0092B-C50C-407E-A947-70E740481C1C}">
+                <a14:useLocalDpi xmlns:a14="http://schemas.microsoft.com/office/drawing/2010/main" val="0"/>
+              </a:ext>
+            </a:extLst>
+          </a:blip>
+          <a:stretch>
+            <a:fillRect/>
+          </a:stretch>
+        </p:blipFill>
+        <p:spPr>
+          <a:xfrm>
+            <a:off x="3714750" y="3230563"/>
+            <a:ext cx="4762500" cy="1971675"/>
+          </a:xfrm>
+        </p:spPr>
+      </p:pic>
+    </p:spTree>
+    <p:extLst>
+      <p:ext uri="{BB962C8B-B14F-4D97-AF65-F5344CB8AC3E}">
+        <p14:creationId xmlns:p14="http://schemas.microsoft.com/office/powerpoint/2010/main" val="4118496400"/>
+      </p:ext>
+    </p:extLst>
+  </p:cSld>
+  <p:clrMapOvr>
+    <a:masterClrMapping/>
+  </p:clrMapOvr>
+</p:sld>
+</file>
+
 <file path=ppt/slides/slide2.xml><?xml version="1.0" encoding="utf-8"?>
 <p:sld xmlns:a="http://schemas.openxmlformats.org/drawingml/2006/main" xmlns:r="http://schemas.openxmlformats.org/officeDocument/2006/relationships" xmlns:p="http://schemas.openxmlformats.org/presentationml/2006/main">
   <p:cSld>

</xml_diff>